<commit_message>
Add further detail to instructions
</commit_message>
<xml_diff>
--- a/ngTalkSlides.pptx
+++ b/ngTalkSlides.pptx
@@ -343,7 +343,7 @@
             <a:fld id="{3F150D65-C64D-44FB-9152-4CC2DE0C9198}" type="datetime1">
               <a:rPr lang="en-US" smtClean="0"/>
               <a:pPr/>
-              <a:t>4/9/14</a:t>
+              <a:t>4/21/14</a:t>
             </a:fld>
             <a:endParaRPr lang="en-US"/>
           </a:p>
@@ -558,7 +558,7 @@
             <a:fld id="{42635EB0-D091-417E-ACD5-D65E1C7D8524}" type="datetime1">
               <a:rPr lang="en-US" smtClean="0"/>
               <a:pPr/>
-              <a:t>4/9/14</a:t>
+              <a:t>4/21/14</a:t>
             </a:fld>
             <a:endParaRPr lang="en-US"/>
           </a:p>
@@ -735,7 +735,7 @@
             <a:fld id="{7FCA09F9-C7D6-4C52-A7E8-5101239A0BA2}" type="datetime1">
               <a:rPr lang="en-US" smtClean="0"/>
               <a:pPr/>
-              <a:t>4/9/14</a:t>
+              <a:t>4/21/14</a:t>
             </a:fld>
             <a:endParaRPr lang="en-US"/>
           </a:p>
@@ -902,7 +902,7 @@
             <a:fld id="{0FFE64A4-35FB-42B6-9183-2C0CE0E36649}" type="datetime1">
               <a:rPr lang="en-US" smtClean="0"/>
               <a:pPr/>
-              <a:t>4/9/14</a:t>
+              <a:t>4/21/14</a:t>
             </a:fld>
             <a:endParaRPr lang="en-US"/>
           </a:p>
@@ -1188,7 +1188,7 @@
             <a:fld id="{2A2683B9-6ECA-47FA-93CF-B124A0FAC208}" type="datetime1">
               <a:rPr lang="en-US" smtClean="0"/>
               <a:pPr/>
-              <a:t>4/9/14</a:t>
+              <a:t>4/21/14</a:t>
             </a:fld>
             <a:endParaRPr lang="en-US"/>
           </a:p>
@@ -1516,7 +1516,7 @@
             <a:fld id="{305FF66B-9476-4BB3-85E9-E01854F07F90}" type="datetime1">
               <a:rPr lang="en-US" smtClean="0"/>
               <a:pPr/>
-              <a:t>4/9/14</a:t>
+              <a:t>4/21/14</a:t>
             </a:fld>
             <a:endParaRPr lang="en-US"/>
           </a:p>
@@ -1943,7 +1943,7 @@
             <a:fld id="{56B23FBD-8F7D-4F85-8085-67BFDB05CB71}" type="datetime1">
               <a:rPr lang="en-US" smtClean="0"/>
               <a:pPr/>
-              <a:t>4/9/14</a:t>
+              <a:t>4/21/14</a:t>
             </a:fld>
             <a:endParaRPr lang="en-US"/>
           </a:p>
@@ -2118,7 +2118,7 @@
             <a:fld id="{465D789A-1220-4441-8676-44A034051BFD}" type="datetime1">
               <a:rPr lang="en-US" smtClean="0"/>
               <a:pPr/>
-              <a:t>4/9/14</a:t>
+              <a:t>4/21/14</a:t>
             </a:fld>
             <a:endParaRPr lang="en-US"/>
           </a:p>
@@ -2210,7 +2210,7 @@
             <a:fld id="{EF98A266-E364-4B5E-98DD-432668182E1E}" type="datetime1">
               <a:rPr lang="en-US" smtClean="0"/>
               <a:pPr/>
-              <a:t>4/9/14</a:t>
+              <a:t>4/21/14</a:t>
             </a:fld>
             <a:endParaRPr lang="en-US"/>
           </a:p>
@@ -2492,7 +2492,7 @@
             <a:fld id="{493F2040-9975-4642-A906-1DF87F8BE202}" type="datetime1">
               <a:rPr lang="en-US" smtClean="0"/>
               <a:pPr/>
-              <a:t>4/9/14</a:t>
+              <a:t>4/21/14</a:t>
             </a:fld>
             <a:endParaRPr lang="en-US"/>
           </a:p>
@@ -2793,7 +2793,7 @@
             <a:fld id="{51E52B4A-BA08-4841-AB08-A0D822ABC34D}" type="datetime1">
               <a:rPr lang="en-US" smtClean="0"/>
               <a:pPr/>
-              <a:t>4/9/14</a:t>
+              <a:t>4/21/14</a:t>
             </a:fld>
             <a:endParaRPr lang="en-US"/>
           </a:p>
@@ -3033,7 +3033,7 @@
             <a:fld id="{75D48070-6A81-47D0-9810-1540B9FEFF61}" type="datetime1">
               <a:rPr lang="en-US" smtClean="0"/>
               <a:pPr/>
-              <a:t>4/9/14</a:t>
+              <a:t>4/21/14</a:t>
             </a:fld>
             <a:endParaRPr lang="en-US"/>
           </a:p>
@@ -3737,7 +3737,7 @@
         <p:spPr/>
         <p:txBody>
           <a:bodyPr>
-            <a:normAutofit fontScale="92500" lnSpcReduction="10000"/>
+            <a:normAutofit fontScale="85000" lnSpcReduction="20000"/>
           </a:bodyPr>
           <a:lstStyle/>
           <a:p>
@@ -3751,13 +3751,49 @@
             </a:r>
             <a:r>
               <a:rPr lang="en-US" dirty="0" smtClean="0"/>
-              <a:t> to input tag</a:t>
-            </a:r>
-          </a:p>
-          <a:p>
-            <a:r>
-              <a:rPr lang="en-US" dirty="0" smtClean="0"/>
-              <a:t>Add a div to the body</a:t>
+              <a:t> to input </a:t>
+            </a:r>
+            <a:r>
+              <a:rPr lang="en-US" dirty="0" smtClean="0"/>
+              <a:t>tag (hint: refer to </a:t>
+            </a:r>
+            <a:r>
+              <a:rPr lang="en-US" dirty="0" err="1" smtClean="0"/>
+              <a:t>app.js</a:t>
+            </a:r>
+            <a:r>
+              <a:rPr lang="en-US" dirty="0" smtClean="0"/>
+              <a:t> to determine what the model name should be)</a:t>
+            </a:r>
+            <a:endParaRPr lang="en-US" dirty="0" smtClean="0"/>
+          </a:p>
+          <a:p>
+            <a:r>
+              <a:rPr lang="en-US" dirty="0"/>
+              <a:t>Interpolate the </a:t>
+            </a:r>
+            <a:r>
+              <a:rPr lang="en-US" dirty="0" err="1"/>
+              <a:t>ngModel</a:t>
+            </a:r>
+            <a:r>
+              <a:rPr lang="en-US" dirty="0"/>
+              <a:t> </a:t>
+            </a:r>
+            <a:r>
+              <a:rPr lang="en-US" dirty="0" smtClean="0"/>
+              <a:t>from the step above</a:t>
+            </a:r>
+            <a:endParaRPr lang="en-US" dirty="0"/>
+          </a:p>
+          <a:p>
+            <a:r>
+              <a:rPr lang="en-US" dirty="0" smtClean="0"/>
+              <a:t>Add </a:t>
+            </a:r>
+            <a:r>
+              <a:rPr lang="en-US" dirty="0" smtClean="0"/>
+              <a:t>a div to the body</a:t>
             </a:r>
           </a:p>
           <a:p>
@@ -3772,17 +3808,19 @@
             </a:r>
             <a:r>
               <a:rPr lang="en-US" dirty="0" smtClean="0"/>
-              <a:t> directive in the div element</a:t>
-            </a:r>
-          </a:p>
-          <a:p>
-            <a:r>
-              <a:rPr lang="en-US" dirty="0" smtClean="0"/>
-              <a:t>Interpolate the </a:t>
+              <a:t> directive in the div </a:t>
+            </a:r>
+            <a:r>
+              <a:rPr lang="en-US" dirty="0" smtClean="0"/>
+              <a:t>element (hint: refer to </a:t>
             </a:r>
             <a:r>
               <a:rPr lang="en-US" dirty="0" err="1" smtClean="0"/>
-              <a:t>ngModel</a:t>
+              <a:t>app.js</a:t>
+            </a:r>
+            <a:r>
+              <a:rPr lang="en-US" dirty="0" smtClean="0"/>
+              <a:t> to determine what model to iterate over)</a:t>
             </a:r>
             <a:endParaRPr lang="en-US" dirty="0" smtClean="0"/>
           </a:p>

</xml_diff>